<commit_message>
Datum zum Pitch Slide hinzugefügt
</commit_message>
<xml_diff>
--- a/Pitch Slide.pptx
+++ b/Pitch Slide.pptx
@@ -205,7 +205,7 @@
           <a:p>
             <a:fld id="{81237534-80DB-AD4B-828A-CAB17A2545E1}" type="datetimeFigureOut">
               <a:rPr lang="de-DE" smtClean="0"/>
-              <a:t>30.05.2024</a:t>
+              <a:t>03.07.2024</a:t>
             </a:fld>
             <a:endParaRPr lang="de-DE"/>
           </a:p>
@@ -706,7 +706,7 @@
           <a:p>
             <a:fld id="{5873932E-FB05-F545-82C3-A3C077C8424E}" type="datetimeFigureOut">
               <a:rPr lang="de-DE" smtClean="0"/>
-              <a:t>30.05.2024</a:t>
+              <a:t>03.07.2024</a:t>
             </a:fld>
             <a:endParaRPr lang="de-DE"/>
           </a:p>
@@ -904,7 +904,7 @@
           <a:p>
             <a:fld id="{5873932E-FB05-F545-82C3-A3C077C8424E}" type="datetimeFigureOut">
               <a:rPr lang="de-DE" smtClean="0"/>
-              <a:t>30.05.2024</a:t>
+              <a:t>03.07.2024</a:t>
             </a:fld>
             <a:endParaRPr lang="de-DE"/>
           </a:p>
@@ -1112,7 +1112,7 @@
           <a:p>
             <a:fld id="{5873932E-FB05-F545-82C3-A3C077C8424E}" type="datetimeFigureOut">
               <a:rPr lang="de-DE" smtClean="0"/>
-              <a:t>30.05.2024</a:t>
+              <a:t>03.07.2024</a:t>
             </a:fld>
             <a:endParaRPr lang="de-DE"/>
           </a:p>
@@ -1310,7 +1310,7 @@
           <a:p>
             <a:fld id="{5873932E-FB05-F545-82C3-A3C077C8424E}" type="datetimeFigureOut">
               <a:rPr lang="de-DE" smtClean="0"/>
-              <a:t>30.05.2024</a:t>
+              <a:t>03.07.2024</a:t>
             </a:fld>
             <a:endParaRPr lang="de-DE"/>
           </a:p>
@@ -1585,7 +1585,7 @@
           <a:p>
             <a:fld id="{5873932E-FB05-F545-82C3-A3C077C8424E}" type="datetimeFigureOut">
               <a:rPr lang="de-DE" smtClean="0"/>
-              <a:t>30.05.2024</a:t>
+              <a:t>03.07.2024</a:t>
             </a:fld>
             <a:endParaRPr lang="de-DE"/>
           </a:p>
@@ -1850,7 +1850,7 @@
           <a:p>
             <a:fld id="{5873932E-FB05-F545-82C3-A3C077C8424E}" type="datetimeFigureOut">
               <a:rPr lang="de-DE" smtClean="0"/>
-              <a:t>30.05.2024</a:t>
+              <a:t>03.07.2024</a:t>
             </a:fld>
             <a:endParaRPr lang="de-DE"/>
           </a:p>
@@ -2262,7 +2262,7 @@
           <a:p>
             <a:fld id="{5873932E-FB05-F545-82C3-A3C077C8424E}" type="datetimeFigureOut">
               <a:rPr lang="de-DE" smtClean="0"/>
-              <a:t>30.05.2024</a:t>
+              <a:t>03.07.2024</a:t>
             </a:fld>
             <a:endParaRPr lang="de-DE"/>
           </a:p>
@@ -2403,7 +2403,7 @@
           <a:p>
             <a:fld id="{5873932E-FB05-F545-82C3-A3C077C8424E}" type="datetimeFigureOut">
               <a:rPr lang="de-DE" smtClean="0"/>
-              <a:t>30.05.2024</a:t>
+              <a:t>03.07.2024</a:t>
             </a:fld>
             <a:endParaRPr lang="de-DE"/>
           </a:p>
@@ -2516,7 +2516,7 @@
           <a:p>
             <a:fld id="{5873932E-FB05-F545-82C3-A3C077C8424E}" type="datetimeFigureOut">
               <a:rPr lang="de-DE" smtClean="0"/>
-              <a:t>30.05.2024</a:t>
+              <a:t>03.07.2024</a:t>
             </a:fld>
             <a:endParaRPr lang="de-DE"/>
           </a:p>
@@ -2827,7 +2827,7 @@
           <a:p>
             <a:fld id="{5873932E-FB05-F545-82C3-A3C077C8424E}" type="datetimeFigureOut">
               <a:rPr lang="de-DE" smtClean="0"/>
-              <a:t>30.05.2024</a:t>
+              <a:t>03.07.2024</a:t>
             </a:fld>
             <a:endParaRPr lang="de-DE"/>
           </a:p>
@@ -3115,7 +3115,7 @@
           <a:p>
             <a:fld id="{5873932E-FB05-F545-82C3-A3C077C8424E}" type="datetimeFigureOut">
               <a:rPr lang="de-DE" smtClean="0"/>
-              <a:t>30.05.2024</a:t>
+              <a:t>03.07.2024</a:t>
             </a:fld>
             <a:endParaRPr lang="de-DE"/>
           </a:p>
@@ -3356,7 +3356,7 @@
           <a:p>
             <a:fld id="{5873932E-FB05-F545-82C3-A3C077C8424E}" type="datetimeFigureOut">
               <a:rPr lang="de-DE" smtClean="0"/>
-              <a:t>30.05.2024</a:t>
+              <a:t>03.07.2024</a:t>
             </a:fld>
             <a:endParaRPr lang="de-DE"/>
           </a:p>
@@ -4198,6 +4198,41 @@
           </a:fontRef>
         </p:style>
       </p:cxnSp>
+      <p:sp>
+        <p:nvSpPr>
+          <p:cNvPr id="3" name="Textfeld 2">
+            <a:extLst>
+              <a:ext uri="{FF2B5EF4-FFF2-40B4-BE49-F238E27FC236}">
+                <a16:creationId xmlns:a16="http://schemas.microsoft.com/office/drawing/2014/main" id="{8F659907-311A-CFAD-98DB-2B46D4F64C6C}"/>
+              </a:ext>
+            </a:extLst>
+          </p:cNvPr>
+          <p:cNvSpPr txBox="1"/>
+          <p:nvPr/>
+        </p:nvSpPr>
+        <p:spPr>
+          <a:xfrm>
+            <a:off x="10867806" y="6488668"/>
+            <a:ext cx="1286540" cy="369332"/>
+          </a:xfrm>
+          <a:prstGeom prst="rect">
+            <a:avLst/>
+          </a:prstGeom>
+          <a:noFill/>
+        </p:spPr>
+        <p:txBody>
+          <a:bodyPr wrap="square" rtlCol="0">
+            <a:spAutoFit/>
+          </a:bodyPr>
+          <a:lstStyle/>
+          <a:p>
+            <a:r>
+              <a:rPr lang="de-DE" dirty="0"/>
+              <a:t>03.07.2024</a:t>
+            </a:r>
+          </a:p>
+        </p:txBody>
+      </p:sp>
     </p:spTree>
     <p:extLst>
       <p:ext uri="{BB962C8B-B14F-4D97-AF65-F5344CB8AC3E}">

</xml_diff>